<commit_message>
added join room screen, and button effects
</commit_message>
<xml_diff>
--- a/Trivia Client/Trivia Client/designer.pptx
+++ b/Trivia Client/Trivia Client/designer.pptx
@@ -3118,51 +3118,6 @@
           </a:p>
         </p:txBody>
       </p:sp>
-      <p:sp>
-        <p:nvSpPr>
-          <p:cNvPr id="7" name="TextBox 6"/>
-          <p:cNvSpPr txBox="1"/>
-          <p:nvPr/>
-        </p:nvSpPr>
-        <p:spPr>
-          <a:xfrm>
-            <a:off x="4972737" y="1707749"/>
-            <a:ext cx="1591205" cy="830997"/>
-          </a:xfrm>
-          <a:prstGeom prst="rect">
-            <a:avLst/>
-          </a:prstGeom>
-          <a:noFill/>
-        </p:spPr>
-        <p:txBody>
-          <a:bodyPr wrap="none" rtlCol="0">
-            <a:spAutoFit/>
-          </a:bodyPr>
-          <a:lstStyle/>
-          <a:p>
-            <a:r>
-              <a:rPr lang="en-US" sz="4800" b="1" dirty="0">
-                <a:solidFill>
-                  <a:schemeClr val="tx1">
-                    <a:lumMod val="85000"/>
-                    <a:lumOff val="15000"/>
-                  </a:schemeClr>
-                </a:solidFill>
-                <a:effectLst>
-                  <a:glow rad="38100">
-                    <a:schemeClr val="bg1">
-                      <a:lumMod val="75000"/>
-                    </a:schemeClr>
-                  </a:glow>
-                </a:effectLst>
-                <a:latin typeface="Dubai Medium" panose="020B0603030403030204" pitchFamily="34" charset="-78"/>
-                <a:cs typeface="Dubai Medium" panose="020B0603030403030204" pitchFamily="34" charset="-78"/>
-              </a:rPr>
-              <a:t>Trivia</a:t>
-            </a:r>
-          </a:p>
-        </p:txBody>
-      </p:sp>
       <p:pic>
         <p:nvPicPr>
           <p:cNvPr id="3" name="תמונה 2"/>
@@ -3185,6 +3140,63 @@
           <a:prstGeom prst="rect">
             <a:avLst/>
           </a:prstGeom>
+        </p:spPr>
+      </p:pic>
+      <p:pic>
+        <p:nvPicPr>
+          <p:cNvPr id="2050" name="Picture 2" descr="Icon Reload Refresh - Free image on Pixabay - Pixabay">
+            <a:extLst>
+              <a:ext uri="{FF2B5EF4-FFF2-40B4-BE49-F238E27FC236}">
+                <a16:creationId xmlns:a16="http://schemas.microsoft.com/office/drawing/2014/main" id="{81C65AD6-5752-1485-4BEE-E4CB11AE75DC}"/>
+              </a:ext>
+            </a:extLst>
+          </p:cNvPr>
+          <p:cNvPicPr>
+            <a:picLocks noChangeAspect="1" noChangeArrowheads="1"/>
+          </p:cNvPicPr>
+          <p:nvPr/>
+        </p:nvPicPr>
+        <p:blipFill>
+          <a:blip r:embed="rId3">
+            <a:clrChange>
+              <a:clrFrom>
+                <a:srgbClr val="FFFFFF"/>
+              </a:clrFrom>
+              <a:clrTo>
+                <a:srgbClr val="FFFFFF">
+                  <a:alpha val="0"/>
+                </a:srgbClr>
+              </a:clrTo>
+            </a:clrChange>
+            <a:extLst>
+              <a:ext uri="{28A0092B-C50C-407E-A947-70E740481C1C}">
+                <a14:useLocalDpi xmlns:a14="http://schemas.microsoft.com/office/drawing/2010/main" val="0"/>
+              </a:ext>
+            </a:extLst>
+          </a:blip>
+          <a:srcRect/>
+          <a:stretch>
+            <a:fillRect/>
+          </a:stretch>
+        </p:blipFill>
+        <p:spPr bwMode="auto">
+          <a:xfrm>
+            <a:off x="-7981950" y="1175655"/>
+            <a:ext cx="6858000" cy="6858000"/>
+          </a:xfrm>
+          <a:prstGeom prst="rect">
+            <a:avLst/>
+          </a:prstGeom>
+          <a:noFill/>
+          <a:extLst>
+            <a:ext uri="{909E8E84-426E-40DD-AFC4-6F175D3DCCD1}">
+              <a14:hiddenFill xmlns:a14="http://schemas.microsoft.com/office/drawing/2010/main">
+                <a:solidFill>
+                  <a:srgbClr val="FFFFFF"/>
+                </a:solidFill>
+              </a14:hiddenFill>
+            </a:ext>
+          </a:extLst>
         </p:spPr>
       </p:pic>
     </p:spTree>

</xml_diff>